<commit_message>
Update to PP by Gary
removed stuff about gantt chart and added a new slide
</commit_message>
<xml_diff>
--- a/Presentation/Team 3 presentation 1.pptx
+++ b/Presentation/Team 3 presentation 1.pptx
@@ -8,9 +8,9 @@
     <p:sldId id="256" r:id="rId2"/>
     <p:sldId id="258" r:id="rId3"/>
     <p:sldId id="261" r:id="rId4"/>
-    <p:sldId id="262" r:id="rId5"/>
-    <p:sldId id="260" r:id="rId6"/>
-    <p:sldId id="257" r:id="rId7"/>
+    <p:sldId id="260" r:id="rId5"/>
+    <p:sldId id="257" r:id="rId6"/>
+    <p:sldId id="262" r:id="rId7"/>
     <p:sldId id="259" r:id="rId8"/>
   </p:sldIdLst>
   <p:sldSz cx="9144000" cy="6858000" type="screen4x3"/>
@@ -307,7 +307,7 @@
           <a:p>
             <a:fld id="{F3A8FAC1-82EC-4D57-AC3C-12CC75A7355D}" type="datetimeFigureOut">
               <a:rPr lang="en-US" smtClean="0"/>
-              <a:t>9/12/2013</a:t>
+              <a:t>9/14/2013</a:t>
             </a:fld>
             <a:endParaRPr lang="en-US"/>
           </a:p>
@@ -472,7 +472,7 @@
           <a:p>
             <a:fld id="{F3A8FAC1-82EC-4D57-AC3C-12CC75A7355D}" type="datetimeFigureOut">
               <a:rPr lang="en-US" smtClean="0"/>
-              <a:t>9/12/2013</a:t>
+              <a:t>9/14/2013</a:t>
             </a:fld>
             <a:endParaRPr lang="en-US"/>
           </a:p>
@@ -647,7 +647,7 @@
           <a:p>
             <a:fld id="{F3A8FAC1-82EC-4D57-AC3C-12CC75A7355D}" type="datetimeFigureOut">
               <a:rPr lang="en-US" smtClean="0"/>
-              <a:t>9/12/2013</a:t>
+              <a:t>9/14/2013</a:t>
             </a:fld>
             <a:endParaRPr lang="en-US"/>
           </a:p>
@@ -812,7 +812,7 @@
           <a:p>
             <a:fld id="{F3A8FAC1-82EC-4D57-AC3C-12CC75A7355D}" type="datetimeFigureOut">
               <a:rPr lang="en-US" smtClean="0"/>
-              <a:t>9/12/2013</a:t>
+              <a:t>9/14/2013</a:t>
             </a:fld>
             <a:endParaRPr lang="en-US"/>
           </a:p>
@@ -1053,7 +1053,7 @@
           <a:p>
             <a:fld id="{F3A8FAC1-82EC-4D57-AC3C-12CC75A7355D}" type="datetimeFigureOut">
               <a:rPr lang="en-US" smtClean="0"/>
-              <a:t>9/12/2013</a:t>
+              <a:t>9/14/2013</a:t>
             </a:fld>
             <a:endParaRPr lang="en-US"/>
           </a:p>
@@ -1336,7 +1336,7 @@
           <a:p>
             <a:fld id="{F3A8FAC1-82EC-4D57-AC3C-12CC75A7355D}" type="datetimeFigureOut">
               <a:rPr lang="en-US" smtClean="0"/>
-              <a:t>9/12/2013</a:t>
+              <a:t>9/14/2013</a:t>
             </a:fld>
             <a:endParaRPr lang="en-US"/>
           </a:p>
@@ -1765,7 +1765,7 @@
           <a:p>
             <a:fld id="{F3A8FAC1-82EC-4D57-AC3C-12CC75A7355D}" type="datetimeFigureOut">
               <a:rPr lang="en-US" smtClean="0"/>
-              <a:t>9/12/2013</a:t>
+              <a:t>9/14/2013</a:t>
             </a:fld>
             <a:endParaRPr lang="en-US"/>
           </a:p>
@@ -1878,7 +1878,7 @@
           <a:p>
             <a:fld id="{F3A8FAC1-82EC-4D57-AC3C-12CC75A7355D}" type="datetimeFigureOut">
               <a:rPr lang="en-US" smtClean="0"/>
-              <a:t>9/12/2013</a:t>
+              <a:t>9/14/2013</a:t>
             </a:fld>
             <a:endParaRPr lang="en-US"/>
           </a:p>
@@ -1968,7 +1968,7 @@
           <a:p>
             <a:fld id="{F3A8FAC1-82EC-4D57-AC3C-12CC75A7355D}" type="datetimeFigureOut">
               <a:rPr lang="en-US" smtClean="0"/>
-              <a:t>9/12/2013</a:t>
+              <a:t>9/14/2013</a:t>
             </a:fld>
             <a:endParaRPr lang="en-US"/>
           </a:p>
@@ -2157,7 +2157,7 @@
           <a:p>
             <a:fld id="{F3A8FAC1-82EC-4D57-AC3C-12CC75A7355D}" type="datetimeFigureOut">
               <a:rPr lang="en-US" smtClean="0"/>
-              <a:t>9/12/2013</a:t>
+              <a:t>9/14/2013</a:t>
             </a:fld>
             <a:endParaRPr lang="en-US"/>
           </a:p>
@@ -2475,7 +2475,7 @@
           <a:p>
             <a:fld id="{F3A8FAC1-82EC-4D57-AC3C-12CC75A7355D}" type="datetimeFigureOut">
               <a:rPr lang="en-US" smtClean="0"/>
-              <a:t>9/12/2013</a:t>
+              <a:t>9/14/2013</a:t>
             </a:fld>
             <a:endParaRPr lang="en-US"/>
           </a:p>
@@ -2854,7 +2854,7 @@
           <a:p>
             <a:fld id="{F3A8FAC1-82EC-4D57-AC3C-12CC75A7355D}" type="datetimeFigureOut">
               <a:rPr lang="en-US" smtClean="0"/>
-              <a:t>9/12/2013</a:t>
+              <a:t>9/14/2013</a:t>
             </a:fld>
             <a:endParaRPr lang="en-US"/>
           </a:p>
@@ -3317,17 +3317,24 @@
             </a:pPr>
             <a:r>
               <a:rPr lang="en-US" dirty="0" smtClean="0"/>
-              <a:t>Create a cutting edge innovative project management software tool to allow small to medium sized companies to keep track of ongoing projects, employees, and costs. This tool shall allow the company to produce Gantt Charts, resource tracking, cost reports, and velocity tracking.  This system will be developed by a small agile team consisting of three hard </a:t>
-            </a:r>
-            <a:r>
-              <a:rPr lang="en-US" smtClean="0"/>
-              <a:t>working </a:t>
-            </a:r>
-            <a:r>
-              <a:rPr lang="en-US" smtClean="0"/>
-              <a:t>developers.</a:t>
-            </a:r>
-            <a:endParaRPr lang="en-US" dirty="0" smtClean="0"/>
+              <a:t>Create a cutting edge innovative project management software tool to allow small to medium sized companies to keep track of ongoing projects, employees, and costs. This tool shall allow the company to </a:t>
+            </a:r>
+            <a:r>
+              <a:rPr lang="en-US" dirty="0" smtClean="0"/>
+              <a:t>perform resource </a:t>
+            </a:r>
+            <a:r>
+              <a:rPr lang="en-US" dirty="0" smtClean="0"/>
+              <a:t>tracking, </a:t>
+            </a:r>
+            <a:r>
+              <a:rPr lang="en-US" dirty="0" smtClean="0"/>
+              <a:t>produce cost </a:t>
+            </a:r>
+            <a:r>
+              <a:rPr lang="en-US" dirty="0" smtClean="0"/>
+              <a:t>reports, and velocity tracking.  This system will be developed by a small agile team consisting of three hard working developers.</a:t>
+            </a:r>
           </a:p>
           <a:p>
             <a:pPr marL="114300" indent="0">
@@ -3504,71 +3511,72 @@
           <a:lstStyle/>
           <a:p>
             <a:r>
+              <a:rPr lang="en-US" dirty="0" err="1" smtClean="0"/>
+              <a:t>Competetors</a:t>
+            </a:r>
+            <a:endParaRPr lang="en-US" dirty="0"/>
+          </a:p>
+        </p:txBody>
+      </p:sp>
+      <p:sp>
+        <p:nvSpPr>
+          <p:cNvPr id="3" name="Content Placeholder 2"/>
+          <p:cNvSpPr>
+            <a:spLocks noGrp="1"/>
+          </p:cNvSpPr>
+          <p:nvPr>
+            <p:ph idx="1"/>
+          </p:nvPr>
+        </p:nvSpPr>
+        <p:spPr/>
+        <p:txBody>
+          <a:bodyPr/>
+          <a:lstStyle/>
+          <a:p>
+            <a:r>
               <a:rPr lang="en-US" dirty="0" smtClean="0"/>
-              <a:t>Concept continued</a:t>
+              <a:t>Microsoft Project</a:t>
+            </a:r>
+          </a:p>
+          <a:p>
+            <a:r>
+              <a:rPr lang="en-US" dirty="0" smtClean="0"/>
+              <a:t>Green Hoper</a:t>
+            </a:r>
+          </a:p>
+          <a:p>
+            <a:r>
+              <a:rPr lang="en-US" dirty="0" smtClean="0"/>
+              <a:t>Excel</a:t>
+            </a:r>
+          </a:p>
+          <a:p>
+            <a:r>
+              <a:rPr lang="en-US" dirty="0" err="1" smtClean="0"/>
+              <a:t>Agilefant</a:t>
+            </a:r>
+            <a:endParaRPr lang="en-US" dirty="0" smtClean="0"/>
+          </a:p>
+          <a:p>
+            <a:r>
+              <a:rPr lang="en-US" dirty="0" err="1" smtClean="0"/>
+              <a:t>VersionOne</a:t>
+            </a:r>
+            <a:endParaRPr lang="en-US" dirty="0" smtClean="0"/>
+          </a:p>
+          <a:p>
+            <a:r>
+              <a:rPr lang="en-US" dirty="0" smtClean="0"/>
+              <a:t>Open Workbench </a:t>
             </a:r>
             <a:endParaRPr lang="en-US" dirty="0"/>
           </a:p>
         </p:txBody>
       </p:sp>
-      <p:pic>
-        <p:nvPicPr>
-          <p:cNvPr id="1026" name="Picture 2"/>
-          <p:cNvPicPr>
-            <a:picLocks noChangeAspect="1" noChangeArrowheads="1"/>
-          </p:cNvPicPr>
-          <p:nvPr/>
-        </p:nvPicPr>
-        <p:blipFill>
-          <a:blip r:embed="rId2">
-            <a:extLst>
-              <a:ext uri="{28A0092B-C50C-407E-A947-70E740481C1C}">
-                <a14:useLocalDpi xmlns:a14="http://schemas.microsoft.com/office/drawing/2010/main" val="0"/>
-              </a:ext>
-            </a:extLst>
-          </a:blip>
-          <a:srcRect/>
-          <a:stretch>
-            <a:fillRect/>
-          </a:stretch>
-        </p:blipFill>
-        <p:spPr bwMode="auto">
-          <a:xfrm>
-            <a:off x="80965" y="1905000"/>
-            <a:ext cx="8301036" cy="4498228"/>
-          </a:xfrm>
-          <a:prstGeom prst="rect">
-            <a:avLst/>
-          </a:prstGeom>
-          <a:noFill/>
-          <a:ln>
-            <a:noFill/>
-          </a:ln>
-          <a:extLst>
-            <a:ext uri="{909E8E84-426E-40DD-AFC4-6F175D3DCCD1}">
-              <a14:hiddenFill xmlns:a14="http://schemas.microsoft.com/office/drawing/2010/main">
-                <a:solidFill>
-                  <a:schemeClr val="accent1"/>
-                </a:solidFill>
-              </a14:hiddenFill>
-            </a:ext>
-            <a:ext uri="{91240B29-F687-4F45-9708-019B960494DF}">
-              <a14:hiddenLine xmlns:a14="http://schemas.microsoft.com/office/drawing/2010/main" w="9525">
-                <a:solidFill>
-                  <a:schemeClr val="tx1"/>
-                </a:solidFill>
-                <a:miter lim="800000"/>
-                <a:headEnd/>
-                <a:tailEnd/>
-              </a14:hiddenLine>
-            </a:ext>
-          </a:extLst>
-        </p:spPr>
-      </p:pic>
     </p:spTree>
     <p:extLst>
       <p:ext uri="{BB962C8B-B14F-4D97-AF65-F5344CB8AC3E}">
-        <p14:creationId xmlns:p14="http://schemas.microsoft.com/office/powerpoint/2010/main" val="2843834562"/>
+        <p14:creationId xmlns:p14="http://schemas.microsoft.com/office/powerpoint/2010/main" val="4085086854"/>
       </p:ext>
     </p:extLst>
   </p:cSld>
@@ -3618,8 +3626,8 @@
           <a:lstStyle/>
           <a:p>
             <a:r>
-              <a:rPr lang="en-US" dirty="0" err="1" smtClean="0"/>
-              <a:t>Competetors</a:t>
+              <a:rPr lang="en-US" dirty="0" smtClean="0"/>
+              <a:t>Features</a:t>
             </a:r>
             <a:endParaRPr lang="en-US" dirty="0"/>
           </a:p>
@@ -3640,35 +3648,88 @@
           <a:bodyPr/>
           <a:lstStyle/>
           <a:p>
+            <a:pPr marL="114300" indent="0">
+              <a:buNone/>
+            </a:pPr>
+            <a:endParaRPr lang="en-US" dirty="0" smtClean="0"/>
+          </a:p>
+          <a:p>
             <a:r>
               <a:rPr lang="en-US" dirty="0" smtClean="0"/>
-              <a:t>Microsoft Project</a:t>
+              <a:t>Multiple projects</a:t>
             </a:r>
           </a:p>
           <a:p>
             <a:r>
               <a:rPr lang="en-US" dirty="0" smtClean="0"/>
-              <a:t>Green Hoper</a:t>
-            </a:r>
-          </a:p>
-          <a:p>
+              <a:t>Tracking</a:t>
+            </a:r>
+          </a:p>
+          <a:p>
+            <a:pPr marL="411480" lvl="1" indent="0">
+              <a:buNone/>
+            </a:pPr>
             <a:r>
               <a:rPr lang="en-US" dirty="0" smtClean="0"/>
-              <a:t>Excel</a:t>
-            </a:r>
-          </a:p>
-          <a:p>
-            <a:r>
-              <a:rPr lang="en-US" dirty="0" err="1" smtClean="0"/>
-              <a:t>Agilefant</a:t>
+              <a:t>	Cost</a:t>
+            </a:r>
+          </a:p>
+          <a:p>
+            <a:pPr marL="411480" lvl="1" indent="0">
+              <a:buNone/>
+            </a:pPr>
+            <a:r>
+              <a:rPr lang="en-US" dirty="0" smtClean="0"/>
+              <a:t>	Hours</a:t>
+            </a:r>
+          </a:p>
+          <a:p>
+            <a:pPr marL="411480" lvl="1" indent="0">
+              <a:buNone/>
+            </a:pPr>
+            <a:r>
+              <a:rPr lang="en-US" dirty="0" smtClean="0"/>
+              <a:t>	Velocity (Sprint Management)</a:t>
+            </a:r>
+          </a:p>
+          <a:p>
+            <a:pPr marL="411480" lvl="1" indent="0">
+              <a:buNone/>
+            </a:pPr>
+            <a:r>
+              <a:rPr lang="en-US" dirty="0"/>
+              <a:t>	</a:t>
+            </a:r>
+            <a:r>
+              <a:rPr lang="en-US" dirty="0" smtClean="0"/>
+              <a:t>Employees</a:t>
+            </a:r>
+          </a:p>
+          <a:p>
+            <a:pPr marL="342900" lvl="1">
+              <a:buClr>
+                <a:schemeClr val="accent1"/>
+              </a:buClr>
+            </a:pPr>
+            <a:r>
+              <a:rPr lang="en-US" sz="2200" dirty="0"/>
+              <a:t>Aggregate Reporting across multiple projects</a:t>
+            </a:r>
+          </a:p>
+          <a:p>
+            <a:pPr marL="411480" lvl="1" indent="0">
+              <a:buNone/>
+            </a:pPr>
+            <a:r>
+              <a:rPr lang="en-US" dirty="0"/>
+              <a:t>	</a:t>
             </a:r>
             <a:endParaRPr lang="en-US" dirty="0" smtClean="0"/>
           </a:p>
           <a:p>
-            <a:r>
-              <a:rPr lang="en-US" dirty="0" err="1" smtClean="0"/>
-              <a:t>VersionOne</a:t>
-            </a:r>
+            <a:pPr marL="411480" lvl="1" indent="0">
+              <a:buNone/>
+            </a:pPr>
             <a:endParaRPr lang="en-US" dirty="0"/>
           </a:p>
         </p:txBody>
@@ -3676,7 +3737,7 @@
     </p:spTree>
     <p:extLst>
       <p:ext uri="{BB962C8B-B14F-4D97-AF65-F5344CB8AC3E}">
-        <p14:creationId xmlns:p14="http://schemas.microsoft.com/office/powerpoint/2010/main" val="4085086854"/>
+        <p14:creationId xmlns:p14="http://schemas.microsoft.com/office/powerpoint/2010/main" val="2464282712"/>
       </p:ext>
     </p:extLst>
   </p:cSld>
@@ -3727,7 +3788,7 @@
           <a:p>
             <a:r>
               <a:rPr lang="en-US" dirty="0" smtClean="0"/>
-              <a:t>Features</a:t>
+              <a:t>The Difference</a:t>
             </a:r>
             <a:endParaRPr lang="en-US" dirty="0"/>
           </a:p>
@@ -3750,107 +3811,47 @@
           <a:p>
             <a:r>
               <a:rPr lang="en-US" dirty="0" smtClean="0"/>
-              <a:t>Gantt Charts</a:t>
-            </a:r>
-          </a:p>
-          <a:p>
+              <a:t>Unlike most popular project management tools suck as MS Project and Open Workbench</a:t>
+            </a:r>
+          </a:p>
+          <a:p>
+            <a:pPr lvl="1"/>
             <a:r>
               <a:rPr lang="en-US" dirty="0" smtClean="0"/>
-              <a:t>Multiple projects</a:t>
-            </a:r>
-          </a:p>
-          <a:p>
+              <a:t>Easy to use</a:t>
+            </a:r>
+          </a:p>
+          <a:p>
+            <a:pPr lvl="1"/>
             <a:r>
               <a:rPr lang="en-US" dirty="0" smtClean="0"/>
-              <a:t>Tracking</a:t>
-            </a:r>
-          </a:p>
-          <a:p>
-            <a:pPr marL="411480" lvl="1" indent="0">
-              <a:buNone/>
-            </a:pPr>
+              <a:t>Made for small to medium sized companies</a:t>
+            </a:r>
+          </a:p>
+          <a:p>
+            <a:pPr lvl="1"/>
             <a:r>
               <a:rPr lang="en-US" dirty="0" smtClean="0"/>
-              <a:t>	Cost</a:t>
-            </a:r>
-          </a:p>
-          <a:p>
-            <a:pPr marL="411480" lvl="1" indent="0">
-              <a:buNone/>
-            </a:pPr>
-            <a:r>
-              <a:rPr lang="en-US" dirty="0" smtClean="0"/>
-              <a:t>	Hours</a:t>
-            </a:r>
-          </a:p>
-          <a:p>
-            <a:pPr marL="411480" lvl="1" indent="0">
-              <a:buNone/>
-            </a:pPr>
-            <a:r>
-              <a:rPr lang="en-US" dirty="0" smtClean="0"/>
-              <a:t>	Velocity (Sprint Management)</a:t>
-            </a:r>
-          </a:p>
-          <a:p>
-            <a:pPr marL="411480" lvl="1" indent="0">
-              <a:buNone/>
-            </a:pPr>
-            <a:r>
-              <a:rPr lang="en-US" dirty="0"/>
-              <a:t>	</a:t>
-            </a:r>
-            <a:r>
-              <a:rPr lang="en-US" dirty="0" smtClean="0"/>
-              <a:t>Employees</a:t>
-            </a:r>
-          </a:p>
-          <a:p>
-            <a:pPr marL="342900" lvl="1">
-              <a:buClr>
-                <a:schemeClr val="accent1"/>
-              </a:buClr>
-            </a:pPr>
-            <a:r>
-              <a:rPr lang="en-US" sz="2200" dirty="0"/>
-              <a:t>Aggregate Reporting across multiple projects</a:t>
-            </a:r>
-          </a:p>
-          <a:p>
-            <a:pPr marL="411480" lvl="1" indent="0">
-              <a:buNone/>
-            </a:pPr>
-            <a:r>
-              <a:rPr lang="en-US" dirty="0"/>
-              <a:t>	</a:t>
-            </a:r>
-            <a:endParaRPr lang="en-US" dirty="0" smtClean="0"/>
-          </a:p>
-          <a:p>
-            <a:pPr marL="411480" lvl="1" indent="0">
-              <a:buNone/>
-            </a:pPr>
-            <a:endParaRPr lang="en-US" dirty="0"/>
+              <a:t>Core functionality without all </a:t>
+            </a:r>
+            <a:r>
+              <a:rPr lang="en-US" smtClean="0"/>
+              <a:t>the fluff</a:t>
+            </a:r>
+            <a:endParaRPr lang="en-US"/>
           </a:p>
         </p:txBody>
       </p:sp>
     </p:spTree>
     <p:extLst>
       <p:ext uri="{BB962C8B-B14F-4D97-AF65-F5344CB8AC3E}">
-        <p14:creationId xmlns:p14="http://schemas.microsoft.com/office/powerpoint/2010/main" val="2464282712"/>
+        <p14:creationId xmlns:p14="http://schemas.microsoft.com/office/powerpoint/2010/main" val="3947741904"/>
       </p:ext>
     </p:extLst>
   </p:cSld>
   <p:clrMapOvr>
     <a:masterClrMapping/>
   </p:clrMapOvr>
-  <p:timing>
-    <p:tnLst>
-      <p:par>
-        <p:cTn id="1" dur="indefinite" restart="never" nodeType="tmRoot"/>
-      </p:par>
-    </p:tnLst>
-  </p:timing>
 </p:sld>
 </file>
 

</xml_diff>